<commit_message>
Update README and DOC (#2)
* update readme

* add doc logo
</commit_message>
<xml_diff>
--- a/docs/_static/logo.pptx
+++ b/docs/_static/logo.pptx
@@ -7,6 +7,7 @@
   <p:sldIdLst>
     <p:sldId id="257" r:id="rId2"/>
     <p:sldId id="258" r:id="rId3"/>
+    <p:sldId id="259" r:id="rId4"/>
   </p:sldIdLst>
   <p:sldSz cx="12192000" cy="6858000"/>
   <p:notesSz cx="6858000" cy="9144000"/>
@@ -3806,6 +3807,149 @@
 </p:sld>
 </file>
 
+<file path=ppt/slides/slide3.xml><?xml version="1.0" encoding="utf-8"?>
+<p:sld xmlns:a="http://schemas.openxmlformats.org/drawingml/2006/main" xmlns:r="http://schemas.openxmlformats.org/officeDocument/2006/relationships" xmlns:p="http://schemas.openxmlformats.org/presentationml/2006/main">
+  <p:cSld>
+    <p:spTree>
+      <p:nvGrpSpPr>
+        <p:cNvPr id="1" name=""/>
+        <p:cNvGrpSpPr/>
+        <p:nvPr/>
+      </p:nvGrpSpPr>
+      <p:grpSpPr>
+        <a:xfrm>
+          <a:off x="0" y="0"/>
+          <a:ext cx="0" cy="0"/>
+          <a:chOff x="0" y="0"/>
+          <a:chExt cx="0" cy="0"/>
+        </a:xfrm>
+      </p:grpSpPr>
+      <p:sp>
+        <p:nvSpPr>
+          <p:cNvPr id="8" name="文本框 7">
+            <a:extLst>
+              <a:ext uri="{FF2B5EF4-FFF2-40B4-BE49-F238E27FC236}">
+                <a16:creationId xmlns:a16="http://schemas.microsoft.com/office/drawing/2014/main" id="{A302409D-AF28-4738-8F66-8A95FE98B32A}"/>
+              </a:ext>
+            </a:extLst>
+          </p:cNvPr>
+          <p:cNvSpPr txBox="1"/>
+          <p:nvPr/>
+        </p:nvSpPr>
+        <p:spPr>
+          <a:xfrm>
+            <a:off x="2977815" y="2177530"/>
+            <a:ext cx="3663617" cy="1296000"/>
+          </a:xfrm>
+          <a:prstGeom prst="rect">
+            <a:avLst/>
+          </a:prstGeom>
+          <a:noFill/>
+        </p:spPr>
+        <p:style>
+          <a:lnRef idx="2">
+            <a:schemeClr val="accent2"/>
+          </a:lnRef>
+          <a:fillRef idx="1">
+            <a:schemeClr val="lt1"/>
+          </a:fillRef>
+          <a:effectRef idx="0">
+            <a:schemeClr val="accent2"/>
+          </a:effectRef>
+          <a:fontRef idx="minor">
+            <a:schemeClr val="dk1"/>
+          </a:fontRef>
+        </p:style>
+        <p:txBody>
+          <a:bodyPr wrap="square" rtlCol="0">
+            <a:spAutoFit/>
+          </a:bodyPr>
+          <a:lstStyle/>
+          <a:p>
+            <a:endParaRPr lang="zh-CN" altLang="en-US" dirty="0"/>
+          </a:p>
+        </p:txBody>
+      </p:sp>
+      <p:sp>
+        <p:nvSpPr>
+          <p:cNvPr id="4" name="文本框 3">
+            <a:extLst>
+              <a:ext uri="{FF2B5EF4-FFF2-40B4-BE49-F238E27FC236}">
+                <a16:creationId xmlns:a16="http://schemas.microsoft.com/office/drawing/2014/main" id="{EC469E72-12CB-4998-9376-B77AAC21B6F4}"/>
+              </a:ext>
+            </a:extLst>
+          </p:cNvPr>
+          <p:cNvSpPr txBox="1"/>
+          <p:nvPr/>
+        </p:nvSpPr>
+        <p:spPr>
+          <a:xfrm>
+            <a:off x="2977815" y="2317698"/>
+            <a:ext cx="3663617" cy="1015663"/>
+          </a:xfrm>
+          <a:prstGeom prst="rect">
+            <a:avLst/>
+          </a:prstGeom>
+          <a:noFill/>
+        </p:spPr>
+        <p:txBody>
+          <a:bodyPr wrap="square" rtlCol="0">
+            <a:spAutoFit/>
+          </a:bodyPr>
+          <a:lstStyle/>
+          <a:p>
+            <a:pPr algn="ctr"/>
+            <a:r>
+              <a:rPr lang="en-US" altLang="zh-CN" sz="6000" b="1" kern="0" spc="200" dirty="0" err="1">
+                <a:ln w="22225">
+                  <a:solidFill>
+                    <a:schemeClr val="accent2"/>
+                  </a:solidFill>
+                  <a:prstDash val="solid"/>
+                </a:ln>
+                <a:solidFill>
+                  <a:schemeClr val="accent2">
+                    <a:lumMod val="40000"/>
+                    <a:lumOff val="60000"/>
+                  </a:schemeClr>
+                </a:solidFill>
+                <a:latin typeface="Cascadia Mono SemiBold" panose="020B0609020000020004" pitchFamily="49" charset="0"/>
+                <a:cs typeface="Cascadia Mono SemiBold" panose="020B0609020000020004" pitchFamily="49" charset="0"/>
+              </a:rPr>
+              <a:t>SAIUnit</a:t>
+            </a:r>
+            <a:endParaRPr lang="zh-CN" altLang="en-US" sz="6000" b="1" kern="0" spc="200" dirty="0">
+              <a:ln w="22225">
+                <a:solidFill>
+                  <a:schemeClr val="accent2"/>
+                </a:solidFill>
+                <a:prstDash val="solid"/>
+              </a:ln>
+              <a:solidFill>
+                <a:schemeClr val="accent2">
+                  <a:lumMod val="40000"/>
+                  <a:lumOff val="60000"/>
+                </a:schemeClr>
+              </a:solidFill>
+              <a:latin typeface="Cascadia Mono SemiBold" panose="020B0609020000020004" pitchFamily="49" charset="0"/>
+              <a:cs typeface="Cascadia Mono SemiBold" panose="020B0609020000020004" pitchFamily="49" charset="0"/>
+            </a:endParaRPr>
+          </a:p>
+        </p:txBody>
+      </p:sp>
+    </p:spTree>
+    <p:extLst>
+      <p:ext uri="{BB962C8B-B14F-4D97-AF65-F5344CB8AC3E}">
+        <p14:creationId xmlns:p14="http://schemas.microsoft.com/office/powerpoint/2010/main" val="3908836943"/>
+      </p:ext>
+    </p:extLst>
+  </p:cSld>
+  <p:clrMapOvr>
+    <a:masterClrMapping/>
+  </p:clrMapOvr>
+</p:sld>
+</file>
+
 <file path=ppt/theme/theme1.xml><?xml version="1.0" encoding="utf-8"?>
 <a:theme xmlns:a="http://schemas.openxmlformats.org/drawingml/2006/main" name="Office 主题​​">
   <a:themeElements>

</xml_diff>

<commit_message>
update logo, doc, and fix
</commit_message>
<xml_diff>
--- a/docs/_static/logo.pptx
+++ b/docs/_static/logo.pptx
@@ -7,7 +7,8 @@
   <p:sldIdLst>
     <p:sldId id="257" r:id="rId2"/>
     <p:sldId id="258" r:id="rId3"/>
-    <p:sldId id="259" r:id="rId4"/>
+    <p:sldId id="260" r:id="rId4"/>
+    <p:sldId id="259" r:id="rId5"/>
   </p:sldIdLst>
   <p:sldSz cx="12192000" cy="6858000"/>
   <p:notesSz cx="6858000" cy="9144000"/>
@@ -3838,6 +3839,254 @@
         </p:nvSpPr>
         <p:spPr>
           <a:xfrm>
+            <a:off x="2089659" y="2177530"/>
+            <a:ext cx="6478772" cy="2047140"/>
+          </a:xfrm>
+          <a:prstGeom prst="rect">
+            <a:avLst/>
+          </a:prstGeom>
+          <a:noFill/>
+        </p:spPr>
+        <p:style>
+          <a:lnRef idx="2">
+            <a:schemeClr val="accent2"/>
+          </a:lnRef>
+          <a:fillRef idx="1">
+            <a:schemeClr val="lt1"/>
+          </a:fillRef>
+          <a:effectRef idx="0">
+            <a:schemeClr val="accent2"/>
+          </a:effectRef>
+          <a:fontRef idx="minor">
+            <a:schemeClr val="dk1"/>
+          </a:fontRef>
+        </p:style>
+        <p:txBody>
+          <a:bodyPr wrap="square" rtlCol="0">
+            <a:spAutoFit/>
+          </a:bodyPr>
+          <a:lstStyle/>
+          <a:p>
+            <a:endParaRPr lang="zh-CN" altLang="en-US" dirty="0"/>
+          </a:p>
+        </p:txBody>
+      </p:sp>
+      <p:sp>
+        <p:nvSpPr>
+          <p:cNvPr id="4" name="文本框 3">
+            <a:extLst>
+              <a:ext uri="{FF2B5EF4-FFF2-40B4-BE49-F238E27FC236}">
+                <a16:creationId xmlns:a16="http://schemas.microsoft.com/office/drawing/2014/main" id="{EC469E72-12CB-4998-9376-B77AAC21B6F4}"/>
+              </a:ext>
+            </a:extLst>
+          </p:cNvPr>
+          <p:cNvSpPr txBox="1"/>
+          <p:nvPr/>
+        </p:nvSpPr>
+        <p:spPr>
+          <a:xfrm>
+            <a:off x="3211318" y="2290944"/>
+            <a:ext cx="4235455" cy="1015663"/>
+          </a:xfrm>
+          <a:prstGeom prst="rect">
+            <a:avLst/>
+          </a:prstGeom>
+          <a:noFill/>
+        </p:spPr>
+        <p:txBody>
+          <a:bodyPr wrap="none" rtlCol="0">
+            <a:spAutoFit/>
+          </a:bodyPr>
+          <a:lstStyle/>
+          <a:p>
+            <a:r>
+              <a:rPr lang="en-US" altLang="zh-CN" sz="6000" b="1" kern="0" spc="1000" dirty="0" err="1">
+                <a:ln w="22225">
+                  <a:solidFill>
+                    <a:schemeClr val="accent2"/>
+                  </a:solidFill>
+                  <a:prstDash val="solid"/>
+                </a:ln>
+                <a:solidFill>
+                  <a:schemeClr val="accent2">
+                    <a:lumMod val="40000"/>
+                    <a:lumOff val="60000"/>
+                  </a:schemeClr>
+                </a:solidFill>
+                <a:latin typeface="Cascadia Mono SemiBold" panose="020B0609020000020004" pitchFamily="49" charset="0"/>
+                <a:cs typeface="Cascadia Mono SemiBold" panose="020B0609020000020004" pitchFamily="49" charset="0"/>
+              </a:rPr>
+              <a:t>SAIUnit</a:t>
+            </a:r>
+            <a:endParaRPr lang="zh-CN" altLang="en-US" sz="6000" b="1" kern="0" spc="1000" dirty="0">
+              <a:ln w="22225">
+                <a:solidFill>
+                  <a:schemeClr val="accent2"/>
+                </a:solidFill>
+                <a:prstDash val="solid"/>
+              </a:ln>
+              <a:solidFill>
+                <a:schemeClr val="accent2">
+                  <a:lumMod val="40000"/>
+                  <a:lumOff val="60000"/>
+                </a:schemeClr>
+              </a:solidFill>
+              <a:latin typeface="Cascadia Mono SemiBold" panose="020B0609020000020004" pitchFamily="49" charset="0"/>
+              <a:cs typeface="Cascadia Mono SemiBold" panose="020B0609020000020004" pitchFamily="49" charset="0"/>
+            </a:endParaRPr>
+          </a:p>
+        </p:txBody>
+      </p:sp>
+      <p:sp>
+        <p:nvSpPr>
+          <p:cNvPr id="5" name="文本框 4">
+            <a:extLst>
+              <a:ext uri="{FF2B5EF4-FFF2-40B4-BE49-F238E27FC236}">
+                <a16:creationId xmlns:a16="http://schemas.microsoft.com/office/drawing/2014/main" id="{2100D721-6F19-4E12-B402-54D6E239088D}"/>
+              </a:ext>
+            </a:extLst>
+          </p:cNvPr>
+          <p:cNvSpPr txBox="1"/>
+          <p:nvPr/>
+        </p:nvSpPr>
+        <p:spPr>
+          <a:xfrm>
+            <a:off x="2452296" y="3551393"/>
+            <a:ext cx="5753498" cy="461665"/>
+          </a:xfrm>
+          <a:prstGeom prst="rect">
+            <a:avLst/>
+          </a:prstGeom>
+          <a:noFill/>
+        </p:spPr>
+        <p:txBody>
+          <a:bodyPr wrap="none" rtlCol="0">
+            <a:spAutoFit/>
+          </a:bodyPr>
+          <a:lstStyle/>
+          <a:p>
+            <a:r>
+              <a:rPr lang="en-US" altLang="zh-CN" sz="2400" b="1" dirty="0">
+                <a:solidFill>
+                  <a:schemeClr val="accent2"/>
+                </a:solidFill>
+              </a:rPr>
+              <a:t>Unit</a:t>
+            </a:r>
+            <a:r>
+              <a:rPr lang="en-US" altLang="zh-CN" sz="2400" dirty="0"/>
+              <a:t>-aware computation for </a:t>
+            </a:r>
+            <a:r>
+              <a:rPr lang="en-US" altLang="zh-CN" sz="2400" b="1" dirty="0">
+                <a:solidFill>
+                  <a:schemeClr val="accent2"/>
+                </a:solidFill>
+              </a:rPr>
+              <a:t>S</a:t>
+            </a:r>
+            <a:r>
+              <a:rPr lang="en-US" altLang="zh-CN" sz="2400" dirty="0"/>
+              <a:t>cientific </a:t>
+            </a:r>
+            <a:r>
+              <a:rPr lang="en-US" altLang="zh-CN" sz="2400" b="1" dirty="0">
+                <a:solidFill>
+                  <a:schemeClr val="accent2"/>
+                </a:solidFill>
+              </a:rPr>
+              <a:t>AI</a:t>
+            </a:r>
+            <a:endParaRPr lang="zh-CN" altLang="en-US" sz="2400" b="1" dirty="0">
+              <a:solidFill>
+                <a:schemeClr val="accent2"/>
+              </a:solidFill>
+            </a:endParaRPr>
+          </a:p>
+        </p:txBody>
+      </p:sp>
+      <p:cxnSp>
+        <p:nvCxnSpPr>
+          <p:cNvPr id="7" name="直接连接符 6">
+            <a:extLst>
+              <a:ext uri="{FF2B5EF4-FFF2-40B4-BE49-F238E27FC236}">
+                <a16:creationId xmlns:a16="http://schemas.microsoft.com/office/drawing/2014/main" id="{3CE4DB9D-9B65-438A-AD9D-700D4CA7372F}"/>
+              </a:ext>
+            </a:extLst>
+          </p:cNvPr>
+          <p:cNvCxnSpPr>
+            <a:cxnSpLocks/>
+          </p:cNvCxnSpPr>
+          <p:nvPr/>
+        </p:nvCxnSpPr>
+        <p:spPr>
+          <a:xfrm>
+            <a:off x="2536227" y="3370402"/>
+            <a:ext cx="5585637" cy="0"/>
+          </a:xfrm>
+          <a:prstGeom prst="line">
+            <a:avLst/>
+          </a:prstGeom>
+        </p:spPr>
+        <p:style>
+          <a:lnRef idx="1">
+            <a:schemeClr val="accent2"/>
+          </a:lnRef>
+          <a:fillRef idx="0">
+            <a:schemeClr val="accent2"/>
+          </a:fillRef>
+          <a:effectRef idx="0">
+            <a:schemeClr val="accent2"/>
+          </a:effectRef>
+          <a:fontRef idx="minor">
+            <a:schemeClr val="tx1"/>
+          </a:fontRef>
+        </p:style>
+      </p:cxnSp>
+    </p:spTree>
+    <p:extLst>
+      <p:ext uri="{BB962C8B-B14F-4D97-AF65-F5344CB8AC3E}">
+        <p14:creationId xmlns:p14="http://schemas.microsoft.com/office/powerpoint/2010/main" val="3352066986"/>
+      </p:ext>
+    </p:extLst>
+  </p:cSld>
+  <p:clrMapOvr>
+    <a:masterClrMapping/>
+  </p:clrMapOvr>
+</p:sld>
+</file>
+
+<file path=ppt/slides/slide4.xml><?xml version="1.0" encoding="utf-8"?>
+<p:sld xmlns:a="http://schemas.openxmlformats.org/drawingml/2006/main" xmlns:r="http://schemas.openxmlformats.org/officeDocument/2006/relationships" xmlns:p="http://schemas.openxmlformats.org/presentationml/2006/main">
+  <p:cSld>
+    <p:spTree>
+      <p:nvGrpSpPr>
+        <p:cNvPr id="1" name=""/>
+        <p:cNvGrpSpPr/>
+        <p:nvPr/>
+      </p:nvGrpSpPr>
+      <p:grpSpPr>
+        <a:xfrm>
+          <a:off x="0" y="0"/>
+          <a:ext cx="0" cy="0"/>
+          <a:chOff x="0" y="0"/>
+          <a:chExt cx="0" cy="0"/>
+        </a:xfrm>
+      </p:grpSpPr>
+      <p:sp>
+        <p:nvSpPr>
+          <p:cNvPr id="8" name="文本框 7">
+            <a:extLst>
+              <a:ext uri="{FF2B5EF4-FFF2-40B4-BE49-F238E27FC236}">
+                <a16:creationId xmlns:a16="http://schemas.microsoft.com/office/drawing/2014/main" id="{A302409D-AF28-4738-8F66-8A95FE98B32A}"/>
+              </a:ext>
+            </a:extLst>
+          </p:cNvPr>
+          <p:cNvSpPr txBox="1"/>
+          <p:nvPr/>
+        </p:nvSpPr>
+        <p:spPr>
+          <a:xfrm>
             <a:off x="2977815" y="2177530"/>
             <a:ext cx="3663617" cy="1296000"/>
           </a:xfrm>

</xml_diff>

<commit_message>
update logo, doc, and fix (#7)
</commit_message>
<xml_diff>
--- a/docs/_static/logo.pptx
+++ b/docs/_static/logo.pptx
@@ -7,7 +7,8 @@
   <p:sldIdLst>
     <p:sldId id="257" r:id="rId2"/>
     <p:sldId id="258" r:id="rId3"/>
-    <p:sldId id="259" r:id="rId4"/>
+    <p:sldId id="260" r:id="rId4"/>
+    <p:sldId id="259" r:id="rId5"/>
   </p:sldIdLst>
   <p:sldSz cx="12192000" cy="6858000"/>
   <p:notesSz cx="6858000" cy="9144000"/>
@@ -3838,6 +3839,254 @@
         </p:nvSpPr>
         <p:spPr>
           <a:xfrm>
+            <a:off x="2089659" y="2177530"/>
+            <a:ext cx="6478772" cy="2047140"/>
+          </a:xfrm>
+          <a:prstGeom prst="rect">
+            <a:avLst/>
+          </a:prstGeom>
+          <a:noFill/>
+        </p:spPr>
+        <p:style>
+          <a:lnRef idx="2">
+            <a:schemeClr val="accent2"/>
+          </a:lnRef>
+          <a:fillRef idx="1">
+            <a:schemeClr val="lt1"/>
+          </a:fillRef>
+          <a:effectRef idx="0">
+            <a:schemeClr val="accent2"/>
+          </a:effectRef>
+          <a:fontRef idx="minor">
+            <a:schemeClr val="dk1"/>
+          </a:fontRef>
+        </p:style>
+        <p:txBody>
+          <a:bodyPr wrap="square" rtlCol="0">
+            <a:spAutoFit/>
+          </a:bodyPr>
+          <a:lstStyle/>
+          <a:p>
+            <a:endParaRPr lang="zh-CN" altLang="en-US" dirty="0"/>
+          </a:p>
+        </p:txBody>
+      </p:sp>
+      <p:sp>
+        <p:nvSpPr>
+          <p:cNvPr id="4" name="文本框 3">
+            <a:extLst>
+              <a:ext uri="{FF2B5EF4-FFF2-40B4-BE49-F238E27FC236}">
+                <a16:creationId xmlns:a16="http://schemas.microsoft.com/office/drawing/2014/main" id="{EC469E72-12CB-4998-9376-B77AAC21B6F4}"/>
+              </a:ext>
+            </a:extLst>
+          </p:cNvPr>
+          <p:cNvSpPr txBox="1"/>
+          <p:nvPr/>
+        </p:nvSpPr>
+        <p:spPr>
+          <a:xfrm>
+            <a:off x="3211318" y="2290944"/>
+            <a:ext cx="4235455" cy="1015663"/>
+          </a:xfrm>
+          <a:prstGeom prst="rect">
+            <a:avLst/>
+          </a:prstGeom>
+          <a:noFill/>
+        </p:spPr>
+        <p:txBody>
+          <a:bodyPr wrap="none" rtlCol="0">
+            <a:spAutoFit/>
+          </a:bodyPr>
+          <a:lstStyle/>
+          <a:p>
+            <a:r>
+              <a:rPr lang="en-US" altLang="zh-CN" sz="6000" b="1" kern="0" spc="1000" dirty="0" err="1">
+                <a:ln w="22225">
+                  <a:solidFill>
+                    <a:schemeClr val="accent2"/>
+                  </a:solidFill>
+                  <a:prstDash val="solid"/>
+                </a:ln>
+                <a:solidFill>
+                  <a:schemeClr val="accent2">
+                    <a:lumMod val="40000"/>
+                    <a:lumOff val="60000"/>
+                  </a:schemeClr>
+                </a:solidFill>
+                <a:latin typeface="Cascadia Mono SemiBold" panose="020B0609020000020004" pitchFamily="49" charset="0"/>
+                <a:cs typeface="Cascadia Mono SemiBold" panose="020B0609020000020004" pitchFamily="49" charset="0"/>
+              </a:rPr>
+              <a:t>SAIUnit</a:t>
+            </a:r>
+            <a:endParaRPr lang="zh-CN" altLang="en-US" sz="6000" b="1" kern="0" spc="1000" dirty="0">
+              <a:ln w="22225">
+                <a:solidFill>
+                  <a:schemeClr val="accent2"/>
+                </a:solidFill>
+                <a:prstDash val="solid"/>
+              </a:ln>
+              <a:solidFill>
+                <a:schemeClr val="accent2">
+                  <a:lumMod val="40000"/>
+                  <a:lumOff val="60000"/>
+                </a:schemeClr>
+              </a:solidFill>
+              <a:latin typeface="Cascadia Mono SemiBold" panose="020B0609020000020004" pitchFamily="49" charset="0"/>
+              <a:cs typeface="Cascadia Mono SemiBold" panose="020B0609020000020004" pitchFamily="49" charset="0"/>
+            </a:endParaRPr>
+          </a:p>
+        </p:txBody>
+      </p:sp>
+      <p:sp>
+        <p:nvSpPr>
+          <p:cNvPr id="5" name="文本框 4">
+            <a:extLst>
+              <a:ext uri="{FF2B5EF4-FFF2-40B4-BE49-F238E27FC236}">
+                <a16:creationId xmlns:a16="http://schemas.microsoft.com/office/drawing/2014/main" id="{2100D721-6F19-4E12-B402-54D6E239088D}"/>
+              </a:ext>
+            </a:extLst>
+          </p:cNvPr>
+          <p:cNvSpPr txBox="1"/>
+          <p:nvPr/>
+        </p:nvSpPr>
+        <p:spPr>
+          <a:xfrm>
+            <a:off x="2452296" y="3551393"/>
+            <a:ext cx="5753498" cy="461665"/>
+          </a:xfrm>
+          <a:prstGeom prst="rect">
+            <a:avLst/>
+          </a:prstGeom>
+          <a:noFill/>
+        </p:spPr>
+        <p:txBody>
+          <a:bodyPr wrap="none" rtlCol="0">
+            <a:spAutoFit/>
+          </a:bodyPr>
+          <a:lstStyle/>
+          <a:p>
+            <a:r>
+              <a:rPr lang="en-US" altLang="zh-CN" sz="2400" b="1" dirty="0">
+                <a:solidFill>
+                  <a:schemeClr val="accent2"/>
+                </a:solidFill>
+              </a:rPr>
+              <a:t>Unit</a:t>
+            </a:r>
+            <a:r>
+              <a:rPr lang="en-US" altLang="zh-CN" sz="2400" dirty="0"/>
+              <a:t>-aware computation for </a:t>
+            </a:r>
+            <a:r>
+              <a:rPr lang="en-US" altLang="zh-CN" sz="2400" b="1" dirty="0">
+                <a:solidFill>
+                  <a:schemeClr val="accent2"/>
+                </a:solidFill>
+              </a:rPr>
+              <a:t>S</a:t>
+            </a:r>
+            <a:r>
+              <a:rPr lang="en-US" altLang="zh-CN" sz="2400" dirty="0"/>
+              <a:t>cientific </a:t>
+            </a:r>
+            <a:r>
+              <a:rPr lang="en-US" altLang="zh-CN" sz="2400" b="1" dirty="0">
+                <a:solidFill>
+                  <a:schemeClr val="accent2"/>
+                </a:solidFill>
+              </a:rPr>
+              <a:t>AI</a:t>
+            </a:r>
+            <a:endParaRPr lang="zh-CN" altLang="en-US" sz="2400" b="1" dirty="0">
+              <a:solidFill>
+                <a:schemeClr val="accent2"/>
+              </a:solidFill>
+            </a:endParaRPr>
+          </a:p>
+        </p:txBody>
+      </p:sp>
+      <p:cxnSp>
+        <p:nvCxnSpPr>
+          <p:cNvPr id="7" name="直接连接符 6">
+            <a:extLst>
+              <a:ext uri="{FF2B5EF4-FFF2-40B4-BE49-F238E27FC236}">
+                <a16:creationId xmlns:a16="http://schemas.microsoft.com/office/drawing/2014/main" id="{3CE4DB9D-9B65-438A-AD9D-700D4CA7372F}"/>
+              </a:ext>
+            </a:extLst>
+          </p:cNvPr>
+          <p:cNvCxnSpPr>
+            <a:cxnSpLocks/>
+          </p:cNvCxnSpPr>
+          <p:nvPr/>
+        </p:nvCxnSpPr>
+        <p:spPr>
+          <a:xfrm>
+            <a:off x="2536227" y="3370402"/>
+            <a:ext cx="5585637" cy="0"/>
+          </a:xfrm>
+          <a:prstGeom prst="line">
+            <a:avLst/>
+          </a:prstGeom>
+        </p:spPr>
+        <p:style>
+          <a:lnRef idx="1">
+            <a:schemeClr val="accent2"/>
+          </a:lnRef>
+          <a:fillRef idx="0">
+            <a:schemeClr val="accent2"/>
+          </a:fillRef>
+          <a:effectRef idx="0">
+            <a:schemeClr val="accent2"/>
+          </a:effectRef>
+          <a:fontRef idx="minor">
+            <a:schemeClr val="tx1"/>
+          </a:fontRef>
+        </p:style>
+      </p:cxnSp>
+    </p:spTree>
+    <p:extLst>
+      <p:ext uri="{BB962C8B-B14F-4D97-AF65-F5344CB8AC3E}">
+        <p14:creationId xmlns:p14="http://schemas.microsoft.com/office/powerpoint/2010/main" val="3352066986"/>
+      </p:ext>
+    </p:extLst>
+  </p:cSld>
+  <p:clrMapOvr>
+    <a:masterClrMapping/>
+  </p:clrMapOvr>
+</p:sld>
+</file>
+
+<file path=ppt/slides/slide4.xml><?xml version="1.0" encoding="utf-8"?>
+<p:sld xmlns:a="http://schemas.openxmlformats.org/drawingml/2006/main" xmlns:r="http://schemas.openxmlformats.org/officeDocument/2006/relationships" xmlns:p="http://schemas.openxmlformats.org/presentationml/2006/main">
+  <p:cSld>
+    <p:spTree>
+      <p:nvGrpSpPr>
+        <p:cNvPr id="1" name=""/>
+        <p:cNvGrpSpPr/>
+        <p:nvPr/>
+      </p:nvGrpSpPr>
+      <p:grpSpPr>
+        <a:xfrm>
+          <a:off x="0" y="0"/>
+          <a:ext cx="0" cy="0"/>
+          <a:chOff x="0" y="0"/>
+          <a:chExt cx="0" cy="0"/>
+        </a:xfrm>
+      </p:grpSpPr>
+      <p:sp>
+        <p:nvSpPr>
+          <p:cNvPr id="8" name="文本框 7">
+            <a:extLst>
+              <a:ext uri="{FF2B5EF4-FFF2-40B4-BE49-F238E27FC236}">
+                <a16:creationId xmlns:a16="http://schemas.microsoft.com/office/drawing/2014/main" id="{A302409D-AF28-4738-8F66-8A95FE98B32A}"/>
+              </a:ext>
+            </a:extLst>
+          </p:cNvPr>
+          <p:cNvSpPr txBox="1"/>
+          <p:nvPr/>
+        </p:nvSpPr>
+        <p:spPr>
+          <a:xfrm>
             <a:off x="2977815" y="2177530"/>
             <a:ext cx="3663617" cy="1296000"/>
           </a:xfrm>

</xml_diff>